<commit_message>
revise code and add CLTN
</commit_message>
<xml_diff>
--- a/LTN/Report/img/Predicate.pptx
+++ b/LTN/Report/img/Predicate.pptx
@@ -3108,7 +3108,7 @@
         </p:nvSpPr>
         <p:spPr>
           <a:xfrm>
-            <a:off x="307181" y="8501063"/>
+            <a:off x="307181" y="8284858"/>
             <a:ext cx="6243637" cy="528637"/>
           </a:xfrm>
           <a:prstGeom prst="roundRect">
@@ -3161,7 +3161,7 @@
         </p:nvSpPr>
         <p:spPr>
           <a:xfrm>
-            <a:off x="307181" y="7528320"/>
+            <a:off x="307181" y="7064472"/>
             <a:ext cx="2907508" cy="528637"/>
           </a:xfrm>
           <a:prstGeom prst="roundRect">
@@ -3214,7 +3214,7 @@
         </p:nvSpPr>
         <p:spPr>
           <a:xfrm>
-            <a:off x="3643310" y="7528319"/>
+            <a:off x="3643310" y="7064471"/>
             <a:ext cx="2907508" cy="528637"/>
           </a:xfrm>
           <a:prstGeom prst="roundRect">
@@ -3267,7 +3267,7 @@
         </p:nvSpPr>
         <p:spPr>
           <a:xfrm>
-            <a:off x="1975245" y="5831681"/>
+            <a:off x="1966314" y="4723713"/>
             <a:ext cx="2907508" cy="528637"/>
           </a:xfrm>
           <a:prstGeom prst="roundRect">
@@ -3320,7 +3320,7 @@
         </p:nvSpPr>
         <p:spPr>
           <a:xfrm>
-            <a:off x="1975246" y="4499370"/>
+            <a:off x="1975246" y="3499227"/>
             <a:ext cx="2907508" cy="528637"/>
           </a:xfrm>
           <a:prstGeom prst="roundRect">
@@ -3373,7 +3373,7 @@
         </p:nvSpPr>
         <p:spPr>
           <a:xfrm>
-            <a:off x="1975245" y="3164679"/>
+            <a:off x="1975245" y="2278840"/>
             <a:ext cx="2907508" cy="528637"/>
           </a:xfrm>
           <a:prstGeom prst="roundRect">
@@ -3426,7 +3426,7 @@
         </p:nvSpPr>
         <p:spPr>
           <a:xfrm>
-            <a:off x="2809278" y="1829988"/>
+            <a:off x="2809278" y="1058453"/>
             <a:ext cx="1239444" cy="528637"/>
           </a:xfrm>
           <a:prstGeom prst="roundRect">
@@ -3461,7 +3461,7 @@
                   <a:schemeClr val="tx1"/>
                 </a:solidFill>
               </a:rPr>
-              <a:t>Sigmoid</a:t>
+              <a:t>Output</a:t>
             </a:r>
             <a:endParaRPr kumimoji="1" lang="zh-CN" altLang="en-US" dirty="0">
               <a:solidFill>
@@ -3739,7 +3739,7 @@
         </p:nvSpPr>
         <p:spPr>
           <a:xfrm>
-            <a:off x="3214689" y="6729413"/>
+            <a:off x="3214688" y="5944100"/>
             <a:ext cx="428621" cy="428621"/>
           </a:xfrm>
           <a:prstGeom prst="ellipse">
@@ -3769,14 +3769,14 @@
           <a:p>
             <a:pPr algn="ctr"/>
             <a:r>
-              <a:rPr kumimoji="1" lang="en-US" altLang="zh-CN" sz="4000" dirty="0" smtClean="0">
+              <a:rPr kumimoji="1" lang="en-US" altLang="zh-CN" sz="3200" dirty="0" smtClean="0">
                 <a:solidFill>
                   <a:schemeClr val="tx1"/>
                 </a:solidFill>
               </a:rPr>
               <a:t>+</a:t>
             </a:r>
-            <a:endParaRPr kumimoji="1" lang="zh-CN" altLang="en-US" sz="4000" dirty="0">
+            <a:endParaRPr kumimoji="1" lang="zh-CN" altLang="en-US" sz="3200" dirty="0">
               <a:solidFill>
                 <a:schemeClr val="tx1"/>
               </a:solidFill>
@@ -3784,6 +3784,330 @@
           </a:p>
         </p:txBody>
       </p:sp>
+      <p:cxnSp>
+        <p:nvCxnSpPr>
+          <p:cNvPr id="27" name="直线箭头连接符 26"/>
+          <p:cNvCxnSpPr>
+            <a:stCxn id="4" idx="0"/>
+            <a:endCxn id="6" idx="2"/>
+          </p:cNvCxnSpPr>
+          <p:nvPr/>
+        </p:nvCxnSpPr>
+        <p:spPr>
+          <a:xfrm flipV="1">
+            <a:off x="3428999" y="8813495"/>
+            <a:ext cx="1" cy="694835"/>
+          </a:xfrm>
+          <a:prstGeom prst="straightConnector1">
+            <a:avLst/>
+          </a:prstGeom>
+          <a:ln>
+            <a:tailEnd type="triangle"/>
+          </a:ln>
+        </p:spPr>
+        <p:style>
+          <a:lnRef idx="1">
+            <a:schemeClr val="accent1"/>
+          </a:lnRef>
+          <a:fillRef idx="0">
+            <a:schemeClr val="accent1"/>
+          </a:fillRef>
+          <a:effectRef idx="0">
+            <a:schemeClr val="accent1"/>
+          </a:effectRef>
+          <a:fontRef idx="minor">
+            <a:schemeClr val="tx1"/>
+          </a:fontRef>
+        </p:style>
+      </p:cxnSp>
+      <p:cxnSp>
+        <p:nvCxnSpPr>
+          <p:cNvPr id="28" name="直线箭头连接符 27"/>
+          <p:cNvCxnSpPr>
+            <a:stCxn id="6" idx="0"/>
+            <a:endCxn id="7" idx="2"/>
+          </p:cNvCxnSpPr>
+          <p:nvPr/>
+        </p:nvCxnSpPr>
+        <p:spPr>
+          <a:xfrm flipH="1" flipV="1">
+            <a:off x="1760935" y="7593109"/>
+            <a:ext cx="1668065" cy="691749"/>
+          </a:xfrm>
+          <a:prstGeom prst="straightConnector1">
+            <a:avLst/>
+          </a:prstGeom>
+          <a:ln>
+            <a:tailEnd type="triangle"/>
+          </a:ln>
+        </p:spPr>
+        <p:style>
+          <a:lnRef idx="1">
+            <a:schemeClr val="accent1"/>
+          </a:lnRef>
+          <a:fillRef idx="0">
+            <a:schemeClr val="accent1"/>
+          </a:fillRef>
+          <a:effectRef idx="0">
+            <a:schemeClr val="accent1"/>
+          </a:effectRef>
+          <a:fontRef idx="minor">
+            <a:schemeClr val="tx1"/>
+          </a:fontRef>
+        </p:style>
+      </p:cxnSp>
+      <p:cxnSp>
+        <p:nvCxnSpPr>
+          <p:cNvPr id="31" name="直线箭头连接符 30"/>
+          <p:cNvCxnSpPr>
+            <a:stCxn id="6" idx="0"/>
+            <a:endCxn id="8" idx="2"/>
+          </p:cNvCxnSpPr>
+          <p:nvPr/>
+        </p:nvCxnSpPr>
+        <p:spPr>
+          <a:xfrm flipV="1">
+            <a:off x="3429000" y="7593108"/>
+            <a:ext cx="1668064" cy="691750"/>
+          </a:xfrm>
+          <a:prstGeom prst="straightConnector1">
+            <a:avLst/>
+          </a:prstGeom>
+          <a:ln>
+            <a:tailEnd type="triangle"/>
+          </a:ln>
+        </p:spPr>
+        <p:style>
+          <a:lnRef idx="1">
+            <a:schemeClr val="accent1"/>
+          </a:lnRef>
+          <a:fillRef idx="0">
+            <a:schemeClr val="accent1"/>
+          </a:fillRef>
+          <a:effectRef idx="0">
+            <a:schemeClr val="accent1"/>
+          </a:effectRef>
+          <a:fontRef idx="minor">
+            <a:schemeClr val="tx1"/>
+          </a:fontRef>
+        </p:style>
+      </p:cxnSp>
+      <p:cxnSp>
+        <p:nvCxnSpPr>
+          <p:cNvPr id="34" name="直线箭头连接符 33"/>
+          <p:cNvCxnSpPr>
+            <a:stCxn id="7" idx="0"/>
+            <a:endCxn id="25" idx="4"/>
+          </p:cNvCxnSpPr>
+          <p:nvPr/>
+        </p:nvCxnSpPr>
+        <p:spPr>
+          <a:xfrm flipV="1">
+            <a:off x="1760935" y="6372721"/>
+            <a:ext cx="1668064" cy="691751"/>
+          </a:xfrm>
+          <a:prstGeom prst="straightConnector1">
+            <a:avLst/>
+          </a:prstGeom>
+          <a:ln>
+            <a:tailEnd type="triangle"/>
+          </a:ln>
+        </p:spPr>
+        <p:style>
+          <a:lnRef idx="1">
+            <a:schemeClr val="accent1"/>
+          </a:lnRef>
+          <a:fillRef idx="0">
+            <a:schemeClr val="accent1"/>
+          </a:fillRef>
+          <a:effectRef idx="0">
+            <a:schemeClr val="accent1"/>
+          </a:effectRef>
+          <a:fontRef idx="minor">
+            <a:schemeClr val="tx1"/>
+          </a:fontRef>
+        </p:style>
+      </p:cxnSp>
+      <p:cxnSp>
+        <p:nvCxnSpPr>
+          <p:cNvPr id="37" name="直线箭头连接符 36"/>
+          <p:cNvCxnSpPr>
+            <a:stCxn id="8" idx="0"/>
+            <a:endCxn id="25" idx="4"/>
+          </p:cNvCxnSpPr>
+          <p:nvPr/>
+        </p:nvCxnSpPr>
+        <p:spPr>
+          <a:xfrm flipH="1" flipV="1">
+            <a:off x="3428999" y="6372721"/>
+            <a:ext cx="1668065" cy="691750"/>
+          </a:xfrm>
+          <a:prstGeom prst="straightConnector1">
+            <a:avLst/>
+          </a:prstGeom>
+          <a:ln>
+            <a:tailEnd type="triangle"/>
+          </a:ln>
+        </p:spPr>
+        <p:style>
+          <a:lnRef idx="1">
+            <a:schemeClr val="accent1"/>
+          </a:lnRef>
+          <a:fillRef idx="0">
+            <a:schemeClr val="accent1"/>
+          </a:fillRef>
+          <a:effectRef idx="0">
+            <a:schemeClr val="accent1"/>
+          </a:effectRef>
+          <a:fontRef idx="minor">
+            <a:schemeClr val="tx1"/>
+          </a:fontRef>
+        </p:style>
+      </p:cxnSp>
+      <p:cxnSp>
+        <p:nvCxnSpPr>
+          <p:cNvPr id="40" name="直线箭头连接符 39"/>
+          <p:cNvCxnSpPr>
+            <a:stCxn id="25" idx="0"/>
+            <a:endCxn id="13" idx="2"/>
+          </p:cNvCxnSpPr>
+          <p:nvPr/>
+        </p:nvCxnSpPr>
+        <p:spPr>
+          <a:xfrm flipH="1" flipV="1">
+            <a:off x="3420068" y="5252350"/>
+            <a:ext cx="8931" cy="691750"/>
+          </a:xfrm>
+          <a:prstGeom prst="straightConnector1">
+            <a:avLst/>
+          </a:prstGeom>
+          <a:ln>
+            <a:tailEnd type="triangle"/>
+          </a:ln>
+        </p:spPr>
+        <p:style>
+          <a:lnRef idx="1">
+            <a:schemeClr val="accent1"/>
+          </a:lnRef>
+          <a:fillRef idx="0">
+            <a:schemeClr val="accent1"/>
+          </a:fillRef>
+          <a:effectRef idx="0">
+            <a:schemeClr val="accent1"/>
+          </a:effectRef>
+          <a:fontRef idx="minor">
+            <a:schemeClr val="tx1"/>
+          </a:fontRef>
+        </p:style>
+      </p:cxnSp>
+      <p:cxnSp>
+        <p:nvCxnSpPr>
+          <p:cNvPr id="43" name="直线箭头连接符 42"/>
+          <p:cNvCxnSpPr>
+            <a:stCxn id="13" idx="0"/>
+            <a:endCxn id="14" idx="2"/>
+          </p:cNvCxnSpPr>
+          <p:nvPr/>
+        </p:nvCxnSpPr>
+        <p:spPr>
+          <a:xfrm flipV="1">
+            <a:off x="3420068" y="4027864"/>
+            <a:ext cx="8932" cy="695849"/>
+          </a:xfrm>
+          <a:prstGeom prst="straightConnector1">
+            <a:avLst/>
+          </a:prstGeom>
+          <a:ln>
+            <a:tailEnd type="triangle"/>
+          </a:ln>
+        </p:spPr>
+        <p:style>
+          <a:lnRef idx="1">
+            <a:schemeClr val="accent1"/>
+          </a:lnRef>
+          <a:fillRef idx="0">
+            <a:schemeClr val="accent1"/>
+          </a:fillRef>
+          <a:effectRef idx="0">
+            <a:schemeClr val="accent1"/>
+          </a:effectRef>
+          <a:fontRef idx="minor">
+            <a:schemeClr val="tx1"/>
+          </a:fontRef>
+        </p:style>
+      </p:cxnSp>
+      <p:cxnSp>
+        <p:nvCxnSpPr>
+          <p:cNvPr id="46" name="直线箭头连接符 45"/>
+          <p:cNvCxnSpPr>
+            <a:stCxn id="14" idx="0"/>
+            <a:endCxn id="15" idx="2"/>
+          </p:cNvCxnSpPr>
+          <p:nvPr/>
+        </p:nvCxnSpPr>
+        <p:spPr>
+          <a:xfrm flipH="1" flipV="1">
+            <a:off x="3428999" y="2807477"/>
+            <a:ext cx="1" cy="691750"/>
+          </a:xfrm>
+          <a:prstGeom prst="straightConnector1">
+            <a:avLst/>
+          </a:prstGeom>
+          <a:ln>
+            <a:tailEnd type="triangle"/>
+          </a:ln>
+        </p:spPr>
+        <p:style>
+          <a:lnRef idx="1">
+            <a:schemeClr val="accent1"/>
+          </a:lnRef>
+          <a:fillRef idx="0">
+            <a:schemeClr val="accent1"/>
+          </a:fillRef>
+          <a:effectRef idx="0">
+            <a:schemeClr val="accent1"/>
+          </a:effectRef>
+          <a:fontRef idx="minor">
+            <a:schemeClr val="tx1"/>
+          </a:fontRef>
+        </p:style>
+      </p:cxnSp>
+      <p:cxnSp>
+        <p:nvCxnSpPr>
+          <p:cNvPr id="49" name="直线箭头连接符 48"/>
+          <p:cNvCxnSpPr>
+            <a:stCxn id="15" idx="0"/>
+            <a:endCxn id="20" idx="2"/>
+          </p:cNvCxnSpPr>
+          <p:nvPr/>
+        </p:nvCxnSpPr>
+        <p:spPr>
+          <a:xfrm flipV="1">
+            <a:off x="3428999" y="1587090"/>
+            <a:ext cx="1" cy="691750"/>
+          </a:xfrm>
+          <a:prstGeom prst="straightConnector1">
+            <a:avLst/>
+          </a:prstGeom>
+          <a:ln>
+            <a:tailEnd type="triangle"/>
+          </a:ln>
+        </p:spPr>
+        <p:style>
+          <a:lnRef idx="1">
+            <a:schemeClr val="accent1"/>
+          </a:lnRef>
+          <a:fillRef idx="0">
+            <a:schemeClr val="accent1"/>
+          </a:fillRef>
+          <a:effectRef idx="0">
+            <a:schemeClr val="accent1"/>
+          </a:effectRef>
+          <a:fontRef idx="minor">
+            <a:schemeClr val="tx1"/>
+          </a:fontRef>
+        </p:style>
+      </p:cxnSp>
     </p:spTree>
     <p:extLst>
       <p:ext uri="{BB962C8B-B14F-4D97-AF65-F5344CB8AC3E}">
@@ -3794,6 +4118,13 @@
   <p:clrMapOvr>
     <a:masterClrMapping/>
   </p:clrMapOvr>
+  <p:timing>
+    <p:tnLst>
+      <p:par>
+        <p:cTn id="1" dur="indefinite" restart="never" nodeType="tmRoot"/>
+      </p:par>
+    </p:tnLst>
+  </p:timing>
 </p:sld>
 </file>
 

</xml_diff>